<commit_message>
updated book in general
</commit_message>
<xml_diff>
--- a/images/for-editing/chpt1.pptx
+++ b/images/for-editing/chpt1.pptx
@@ -5,11 +5,12 @@
     <p:sldMasterId id="2147483648" r:id="rId1"/>
   </p:sldMasterIdLst>
   <p:sldIdLst>
-    <p:sldId id="256" r:id="rId2"/>
-    <p:sldId id="257" r:id="rId3"/>
-    <p:sldId id="258" r:id="rId4"/>
-    <p:sldId id="259" r:id="rId5"/>
-    <p:sldId id="260" r:id="rId6"/>
+    <p:sldId id="261" r:id="rId2"/>
+    <p:sldId id="256" r:id="rId3"/>
+    <p:sldId id="257" r:id="rId4"/>
+    <p:sldId id="258" r:id="rId5"/>
+    <p:sldId id="259" r:id="rId6"/>
+    <p:sldId id="260" r:id="rId7"/>
   </p:sldIdLst>
   <p:sldSz cx="12192000" cy="6858000"/>
   <p:notesSz cx="6858000" cy="9144000"/>
@@ -108,7 +109,24 @@
       </a:defRPr>
     </a:lvl9pPr>
   </p:defaultTextStyle>
+  <p:extLst>
+    <p:ext uri="{EFAFB233-063F-42B5-8137-9DF3F51BA10A}">
+      <p15:sldGuideLst xmlns:p15="http://schemas.microsoft.com/office/powerpoint/2012/main"/>
+    </p:ext>
+  </p:extLst>
 </p:presentation>
+</file>
+
+<file path=ppt/commentAuthors.xml><?xml version="1.0" encoding="utf-8"?>
+<p:cmAuthorLst xmlns:a="http://schemas.openxmlformats.org/drawingml/2006/main" xmlns:r="http://schemas.openxmlformats.org/officeDocument/2006/relationships" xmlns:p="http://schemas.openxmlformats.org/presentationml/2006/main">
+  <p:cmAuthor id="1" name="Liew, Bernard" initials="LB" lastIdx="1" clrIdx="0">
+    <p:extLst>
+      <p:ext uri="{19B8F6BF-5375-455C-9EA6-DF929625EA0E}">
+        <p15:presenceInfo xmlns:p15="http://schemas.microsoft.com/office/powerpoint/2012/main" userId="Liew, Bernard" providerId="None"/>
+      </p:ext>
+    </p:extLst>
+  </p:cmAuthor>
+</p:cmAuthorLst>
 </file>
 
 <file path=ppt/slideLayouts/slideLayout1.xml><?xml version="1.0" encoding="utf-8"?>
@@ -258,7 +276,7 @@
           <a:p>
             <a:fld id="{369F93F7-39F7-4906-A165-035073E6E4D1}" type="datetimeFigureOut">
               <a:rPr lang="en-US" smtClean="0"/>
-              <a:t>7/16/2020</a:t>
+              <a:t>9/21/2020</a:t>
             </a:fld>
             <a:endParaRPr lang="en-US"/>
           </a:p>
@@ -456,7 +474,7 @@
           <a:p>
             <a:fld id="{369F93F7-39F7-4906-A165-035073E6E4D1}" type="datetimeFigureOut">
               <a:rPr lang="en-US" smtClean="0"/>
-              <a:t>7/16/2020</a:t>
+              <a:t>9/21/2020</a:t>
             </a:fld>
             <a:endParaRPr lang="en-US"/>
           </a:p>
@@ -664,7 +682,7 @@
           <a:p>
             <a:fld id="{369F93F7-39F7-4906-A165-035073E6E4D1}" type="datetimeFigureOut">
               <a:rPr lang="en-US" smtClean="0"/>
-              <a:t>7/16/2020</a:t>
+              <a:t>9/21/2020</a:t>
             </a:fld>
             <a:endParaRPr lang="en-US"/>
           </a:p>
@@ -862,7 +880,7 @@
           <a:p>
             <a:fld id="{369F93F7-39F7-4906-A165-035073E6E4D1}" type="datetimeFigureOut">
               <a:rPr lang="en-US" smtClean="0"/>
-              <a:t>7/16/2020</a:t>
+              <a:t>9/21/2020</a:t>
             </a:fld>
             <a:endParaRPr lang="en-US"/>
           </a:p>
@@ -1137,7 +1155,7 @@
           <a:p>
             <a:fld id="{369F93F7-39F7-4906-A165-035073E6E4D1}" type="datetimeFigureOut">
               <a:rPr lang="en-US" smtClean="0"/>
-              <a:t>7/16/2020</a:t>
+              <a:t>9/21/2020</a:t>
             </a:fld>
             <a:endParaRPr lang="en-US"/>
           </a:p>
@@ -1402,7 +1420,7 @@
           <a:p>
             <a:fld id="{369F93F7-39F7-4906-A165-035073E6E4D1}" type="datetimeFigureOut">
               <a:rPr lang="en-US" smtClean="0"/>
-              <a:t>7/16/2020</a:t>
+              <a:t>9/21/2020</a:t>
             </a:fld>
             <a:endParaRPr lang="en-US"/>
           </a:p>
@@ -1814,7 +1832,7 @@
           <a:p>
             <a:fld id="{369F93F7-39F7-4906-A165-035073E6E4D1}" type="datetimeFigureOut">
               <a:rPr lang="en-US" smtClean="0"/>
-              <a:t>7/16/2020</a:t>
+              <a:t>9/21/2020</a:t>
             </a:fld>
             <a:endParaRPr lang="en-US"/>
           </a:p>
@@ -1955,7 +1973,7 @@
           <a:p>
             <a:fld id="{369F93F7-39F7-4906-A165-035073E6E4D1}" type="datetimeFigureOut">
               <a:rPr lang="en-US" smtClean="0"/>
-              <a:t>7/16/2020</a:t>
+              <a:t>9/21/2020</a:t>
             </a:fld>
             <a:endParaRPr lang="en-US"/>
           </a:p>
@@ -2068,7 +2086,7 @@
           <a:p>
             <a:fld id="{369F93F7-39F7-4906-A165-035073E6E4D1}" type="datetimeFigureOut">
               <a:rPr lang="en-US" smtClean="0"/>
-              <a:t>7/16/2020</a:t>
+              <a:t>9/21/2020</a:t>
             </a:fld>
             <a:endParaRPr lang="en-US"/>
           </a:p>
@@ -2379,7 +2397,7 @@
           <a:p>
             <a:fld id="{369F93F7-39F7-4906-A165-035073E6E4D1}" type="datetimeFigureOut">
               <a:rPr lang="en-US" smtClean="0"/>
-              <a:t>7/16/2020</a:t>
+              <a:t>9/21/2020</a:t>
             </a:fld>
             <a:endParaRPr lang="en-US"/>
           </a:p>
@@ -2667,7 +2685,7 @@
           <a:p>
             <a:fld id="{369F93F7-39F7-4906-A165-035073E6E4D1}" type="datetimeFigureOut">
               <a:rPr lang="en-US" smtClean="0"/>
-              <a:t>7/16/2020</a:t>
+              <a:t>9/21/2020</a:t>
             </a:fld>
             <a:endParaRPr lang="en-US"/>
           </a:p>
@@ -2908,7 +2926,7 @@
           <a:p>
             <a:fld id="{369F93F7-39F7-4906-A165-035073E6E4D1}" type="datetimeFigureOut">
               <a:rPr lang="en-US" smtClean="0"/>
-              <a:t>7/16/2020</a:t>
+              <a:t>9/21/2020</a:t>
             </a:fld>
             <a:endParaRPr lang="en-US"/>
           </a:p>
@@ -3327,13 +3345,7 @@
       </p:grpSpPr>
       <p:sp>
         <p:nvSpPr>
-          <p:cNvPr id="2" name="Title 1">
-            <a:extLst>
-              <a:ext uri="{FF2B5EF4-FFF2-40B4-BE49-F238E27FC236}">
-                <a16:creationId xmlns:a16="http://schemas.microsoft.com/office/drawing/2014/main" id="{5E8E257C-F6B5-4621-A6BE-6C1EAFE1D99A}"/>
-              </a:ext>
-            </a:extLst>
-          </p:cNvPr>
+          <p:cNvPr id="2" name="Title 1"/>
           <p:cNvSpPr>
             <a:spLocks noGrp="1"/>
           </p:cNvSpPr>
@@ -3346,19 +3358,13 @@
           <a:bodyPr/>
           <a:lstStyle/>
           <a:p>
-            <a:endParaRPr lang="en-US"/>
-          </a:p>
-        </p:txBody>
-      </p:sp>
-      <p:sp>
-        <p:nvSpPr>
-          <p:cNvPr id="3" name="Subtitle 2">
-            <a:extLst>
-              <a:ext uri="{FF2B5EF4-FFF2-40B4-BE49-F238E27FC236}">
-                <a16:creationId xmlns:a16="http://schemas.microsoft.com/office/drawing/2014/main" id="{1E46FFF8-EB1A-4A11-BBFA-E8E0AA9BF4D8}"/>
-              </a:ext>
-            </a:extLst>
-          </p:cNvPr>
+            <a:endParaRPr lang="en-GB"/>
+          </a:p>
+        </p:txBody>
+      </p:sp>
+      <p:sp>
+        <p:nvSpPr>
+          <p:cNvPr id="3" name="Subtitle 2"/>
           <p:cNvSpPr>
             <a:spLocks noGrp="1"/>
           </p:cNvSpPr>
@@ -3371,98 +3377,534 @@
           <a:bodyPr/>
           <a:lstStyle/>
           <a:p>
-            <a:endParaRPr lang="en-US"/>
+            <a:endParaRPr lang="en-GB"/>
           </a:p>
         </p:txBody>
       </p:sp>
       <p:pic>
         <p:nvPicPr>
-          <p:cNvPr id="5" name="Picture 4" descr="A screenshot of a social media post&#10;&#10;Description automatically generated">
-            <a:extLst>
-              <a:ext uri="{FF2B5EF4-FFF2-40B4-BE49-F238E27FC236}">
-                <a16:creationId xmlns:a16="http://schemas.microsoft.com/office/drawing/2014/main" id="{7F72D67B-C4F5-4B9B-B426-80F22EACF116}"/>
-              </a:ext>
-            </a:extLst>
-          </p:cNvPr>
+          <p:cNvPr id="5" name="Picture 4"/>
           <p:cNvPicPr>
             <a:picLocks noChangeAspect="1"/>
           </p:cNvPicPr>
           <p:nvPr/>
         </p:nvPicPr>
         <p:blipFill>
-          <a:blip r:embed="rId2">
-            <a:extLst>
-              <a:ext uri="{28A0092B-C50C-407E-A947-70E740481C1C}">
-                <a14:useLocalDpi xmlns:a14="http://schemas.microsoft.com/office/drawing/2010/main" val="0"/>
-              </a:ext>
-            </a:extLst>
-          </a:blip>
+          <a:blip r:embed="rId2"/>
           <a:stretch>
             <a:fillRect/>
           </a:stretch>
         </p:blipFill>
         <p:spPr>
           <a:xfrm>
-            <a:off x="0" y="125811"/>
-            <a:ext cx="12192000" cy="6606377"/>
+            <a:off x="0" y="0"/>
+            <a:ext cx="12192000" cy="6685936"/>
           </a:xfrm>
           <a:prstGeom prst="rect">
             <a:avLst/>
           </a:prstGeom>
+          <a:solidFill>
+            <a:schemeClr val="tx1"/>
+          </a:solidFill>
         </p:spPr>
       </p:pic>
       <p:sp>
         <p:nvSpPr>
-          <p:cNvPr id="6" name="Rectangle 5">
-            <a:extLst>
-              <a:ext uri="{FF2B5EF4-FFF2-40B4-BE49-F238E27FC236}">
-                <a16:creationId xmlns:a16="http://schemas.microsoft.com/office/drawing/2014/main" id="{A62CB3F5-257C-435F-802D-C27B715586C6}"/>
-              </a:ext>
-            </a:extLst>
-          </p:cNvPr>
-          <p:cNvSpPr/>
+          <p:cNvPr id="9" name="TextBox 8"/>
+          <p:cNvSpPr txBox="1"/>
           <p:nvPr/>
         </p:nvSpPr>
         <p:spPr>
-          <a:xfrm rot="19615382">
-            <a:off x="3914091" y="2967335"/>
-            <a:ext cx="4363823" cy="923330"/>
+          <a:xfrm>
+            <a:off x="472301" y="1559690"/>
+            <a:ext cx="3397171" cy="1200329"/>
           </a:xfrm>
           <a:prstGeom prst="rect">
             <a:avLst/>
           </a:prstGeom>
-          <a:noFill/>
+          <a:solidFill>
+            <a:schemeClr val="tx1"/>
+          </a:solidFill>
+          <a:ln>
+            <a:solidFill>
+              <a:schemeClr val="bg1"/>
+            </a:solidFill>
+          </a:ln>
         </p:spPr>
         <p:txBody>
-          <a:bodyPr wrap="none" lIns="91440" tIns="45720" rIns="91440" bIns="45720">
+          <a:bodyPr wrap="square" rtlCol="0">
             <a:spAutoFit/>
           </a:bodyPr>
           <a:lstStyle/>
           <a:p>
+            <a:r>
+              <a:rPr lang="en-GB" dirty="0" smtClean="0">
+                <a:solidFill>
+                  <a:schemeClr val="bg1"/>
+                </a:solidFill>
+              </a:rPr>
+              <a:t>This is where you write your code! </a:t>
+            </a:r>
+          </a:p>
+          <a:p>
+            <a:r>
+              <a:rPr lang="en-GB" dirty="0" smtClean="0">
+                <a:solidFill>
+                  <a:schemeClr val="bg1"/>
+                </a:solidFill>
+              </a:rPr>
+              <a:t>Your code will not be evaluated until you “Run ” them to the console</a:t>
+            </a:r>
+            <a:endParaRPr lang="en-GB" dirty="0"/>
+          </a:p>
+        </p:txBody>
+      </p:sp>
+      <p:sp>
+        <p:nvSpPr>
+          <p:cNvPr id="10" name="TextBox 9"/>
+          <p:cNvSpPr txBox="1"/>
+          <p:nvPr/>
+        </p:nvSpPr>
+        <p:spPr>
+          <a:xfrm>
+            <a:off x="5075113" y="1141843"/>
+            <a:ext cx="1208716" cy="1200329"/>
+          </a:xfrm>
+          <a:prstGeom prst="rect">
+            <a:avLst/>
+          </a:prstGeom>
+          <a:solidFill>
+            <a:schemeClr val="tx1"/>
+          </a:solidFill>
+          <a:ln>
+            <a:solidFill>
+              <a:schemeClr val="bg1"/>
+            </a:solidFill>
+          </a:ln>
+        </p:spPr>
+        <p:txBody>
+          <a:bodyPr wrap="square" rtlCol="0">
+            <a:spAutoFit/>
+          </a:bodyPr>
+          <a:lstStyle/>
+          <a:p>
+            <a:r>
+              <a:rPr lang="en-GB" dirty="0" smtClean="0">
+                <a:solidFill>
+                  <a:schemeClr val="bg1"/>
+                </a:solidFill>
+              </a:rPr>
+              <a:t>Click “Run” to send code to console</a:t>
+            </a:r>
+            <a:endParaRPr lang="en-GB" dirty="0">
+              <a:solidFill>
+                <a:schemeClr val="bg1"/>
+              </a:solidFill>
+            </a:endParaRPr>
+          </a:p>
+        </p:txBody>
+      </p:sp>
+      <p:cxnSp>
+        <p:nvCxnSpPr>
+          <p:cNvPr id="12" name="Straight Arrow Connector 11"/>
+          <p:cNvCxnSpPr/>
+          <p:nvPr/>
+        </p:nvCxnSpPr>
+        <p:spPr>
+          <a:xfrm flipV="1">
+            <a:off x="5679471" y="858644"/>
+            <a:ext cx="0" cy="263719"/>
+          </a:xfrm>
+          <a:prstGeom prst="straightConnector1">
+            <a:avLst/>
+          </a:prstGeom>
+          <a:ln>
+            <a:solidFill>
+              <a:schemeClr val="bg1"/>
+            </a:solidFill>
+            <a:tailEnd type="triangle"/>
+          </a:ln>
+        </p:spPr>
+        <p:style>
+          <a:lnRef idx="1">
+            <a:schemeClr val="accent1"/>
+          </a:lnRef>
+          <a:fillRef idx="0">
+            <a:schemeClr val="accent1"/>
+          </a:fillRef>
+          <a:effectRef idx="0">
+            <a:schemeClr val="accent1"/>
+          </a:effectRef>
+          <a:fontRef idx="minor">
+            <a:schemeClr val="tx1"/>
+          </a:fontRef>
+        </p:style>
+      </p:cxnSp>
+      <p:sp>
+        <p:nvSpPr>
+          <p:cNvPr id="13" name="Oval 12"/>
+          <p:cNvSpPr/>
+          <p:nvPr/>
+        </p:nvSpPr>
+        <p:spPr>
+          <a:xfrm>
+            <a:off x="5311809" y="502130"/>
+            <a:ext cx="547718" cy="574196"/>
+          </a:xfrm>
+          <a:prstGeom prst="ellipse">
+            <a:avLst/>
+          </a:prstGeom>
+          <a:noFill/>
+          <a:ln>
+            <a:solidFill>
+              <a:schemeClr val="bg1"/>
+            </a:solidFill>
+          </a:ln>
+        </p:spPr>
+        <p:style>
+          <a:lnRef idx="2">
+            <a:schemeClr val="accent1">
+              <a:shade val="50000"/>
+            </a:schemeClr>
+          </a:lnRef>
+          <a:fillRef idx="1">
+            <a:schemeClr val="accent1"/>
+          </a:fillRef>
+          <a:effectRef idx="0">
+            <a:schemeClr val="accent1"/>
+          </a:effectRef>
+          <a:fontRef idx="minor">
+            <a:schemeClr val="lt1"/>
+          </a:fontRef>
+        </p:style>
+        <p:txBody>
+          <a:bodyPr rtlCol="0" anchor="ctr"/>
+          <a:lstStyle/>
+          <a:p>
             <a:pPr algn="ctr"/>
-            <a:r>
-              <a:rPr lang="en-US" sz="5400" b="0" cap="none" spc="0" dirty="0">
-                <a:ln w="0"/>
+            <a:endParaRPr lang="en-GB"/>
+          </a:p>
+        </p:txBody>
+      </p:sp>
+      <p:sp>
+        <p:nvSpPr>
+          <p:cNvPr id="14" name="TextBox 13"/>
+          <p:cNvSpPr txBox="1"/>
+          <p:nvPr/>
+        </p:nvSpPr>
+        <p:spPr>
+          <a:xfrm>
+            <a:off x="2977609" y="4245253"/>
+            <a:ext cx="1208716" cy="369332"/>
+          </a:xfrm>
+          <a:prstGeom prst="rect">
+            <a:avLst/>
+          </a:prstGeom>
+          <a:solidFill>
+            <a:schemeClr val="tx1"/>
+          </a:solidFill>
+          <a:ln>
+            <a:solidFill>
+              <a:schemeClr val="bg1"/>
+            </a:solidFill>
+          </a:ln>
+        </p:spPr>
+        <p:txBody>
+          <a:bodyPr wrap="square" rtlCol="0">
+            <a:spAutoFit/>
+          </a:bodyPr>
+          <a:lstStyle/>
+          <a:p>
+            <a:r>
+              <a:rPr lang="en-GB" dirty="0" smtClean="0">
                 <a:solidFill>
-                  <a:schemeClr val="tx1"/>
+                  <a:schemeClr val="bg1"/>
                 </a:solidFill>
-                <a:effectLst>
-                  <a:outerShdw blurRad="38100" dist="19050" dir="2700000" algn="tl" rotWithShape="0">
-                    <a:schemeClr val="dk1">
-                      <a:alpha val="40000"/>
-                    </a:schemeClr>
-                  </a:outerShdw>
-                </a:effectLst>
               </a:rPr>
-              <a:t>Looks like SPSS</a:t>
-            </a:r>
+              <a:t>2. Console</a:t>
+            </a:r>
+            <a:endParaRPr lang="en-GB" dirty="0">
+              <a:solidFill>
+                <a:schemeClr val="bg1"/>
+              </a:solidFill>
+            </a:endParaRPr>
+          </a:p>
+        </p:txBody>
+      </p:sp>
+      <p:sp>
+        <p:nvSpPr>
+          <p:cNvPr id="15" name="TextBox 14"/>
+          <p:cNvSpPr txBox="1"/>
+          <p:nvPr/>
+        </p:nvSpPr>
+        <p:spPr>
+          <a:xfrm>
+            <a:off x="2298167" y="5257800"/>
+            <a:ext cx="4191841" cy="1077218"/>
+          </a:xfrm>
+          <a:prstGeom prst="rect">
+            <a:avLst/>
+          </a:prstGeom>
+          <a:solidFill>
+            <a:schemeClr val="tx1"/>
+          </a:solidFill>
+          <a:ln>
+            <a:solidFill>
+              <a:schemeClr val="bg1"/>
+            </a:solidFill>
+          </a:ln>
+        </p:spPr>
+        <p:txBody>
+          <a:bodyPr wrap="square" rtlCol="0">
+            <a:spAutoFit/>
+          </a:bodyPr>
+          <a:lstStyle/>
+          <a:p>
+            <a:r>
+              <a:rPr lang="en-GB" sz="1600" dirty="0" smtClean="0">
+                <a:solidFill>
+                  <a:schemeClr val="bg1"/>
+                </a:solidFill>
+              </a:rPr>
+              <a:t>This is where your code from Source is evaluated.</a:t>
+            </a:r>
+            <a:endParaRPr lang="en-GB" sz="1600" dirty="0">
+              <a:solidFill>
+                <a:schemeClr val="bg1"/>
+              </a:solidFill>
+            </a:endParaRPr>
+          </a:p>
+          <a:p>
+            <a:r>
+              <a:rPr lang="en-GB" sz="1600" dirty="0" smtClean="0">
+                <a:solidFill>
+                  <a:schemeClr val="bg1"/>
+                </a:solidFill>
+              </a:rPr>
+              <a:t>You can also use the console to perform quick calculations that you don’t want to save.</a:t>
+            </a:r>
+          </a:p>
+        </p:txBody>
+      </p:sp>
+      <p:sp>
+        <p:nvSpPr>
+          <p:cNvPr id="16" name="TextBox 15"/>
+          <p:cNvSpPr txBox="1"/>
+          <p:nvPr/>
+        </p:nvSpPr>
+        <p:spPr>
+          <a:xfrm>
+            <a:off x="8132948" y="805837"/>
+            <a:ext cx="2902714" cy="369332"/>
+          </a:xfrm>
+          <a:prstGeom prst="rect">
+            <a:avLst/>
+          </a:prstGeom>
+          <a:solidFill>
+            <a:schemeClr val="tx1"/>
+          </a:solidFill>
+          <a:ln>
+            <a:solidFill>
+              <a:schemeClr val="bg1"/>
+            </a:solidFill>
+          </a:ln>
+        </p:spPr>
+        <p:txBody>
+          <a:bodyPr wrap="square" rtlCol="0">
+            <a:spAutoFit/>
+          </a:bodyPr>
+          <a:lstStyle/>
+          <a:p>
+            <a:r>
+              <a:rPr lang="en-GB" dirty="0" smtClean="0">
+                <a:solidFill>
+                  <a:schemeClr val="bg1"/>
+                </a:solidFill>
+              </a:rPr>
+              <a:t>3. Environment/ History</a:t>
+            </a:r>
+            <a:endParaRPr lang="en-GB" dirty="0">
+              <a:solidFill>
+                <a:schemeClr val="bg1"/>
+              </a:solidFill>
+            </a:endParaRPr>
+          </a:p>
+        </p:txBody>
+      </p:sp>
+      <p:sp>
+        <p:nvSpPr>
+          <p:cNvPr id="17" name="TextBox 16"/>
+          <p:cNvSpPr txBox="1"/>
+          <p:nvPr/>
+        </p:nvSpPr>
+        <p:spPr>
+          <a:xfrm>
+            <a:off x="7420585" y="1559690"/>
+            <a:ext cx="4191841" cy="830997"/>
+          </a:xfrm>
+          <a:prstGeom prst="rect">
+            <a:avLst/>
+          </a:prstGeom>
+          <a:solidFill>
+            <a:schemeClr val="tx1"/>
+          </a:solidFill>
+          <a:ln>
+            <a:solidFill>
+              <a:schemeClr val="bg1"/>
+            </a:solidFill>
+          </a:ln>
+        </p:spPr>
+        <p:txBody>
+          <a:bodyPr wrap="square" rtlCol="0">
+            <a:spAutoFit/>
+          </a:bodyPr>
+          <a:lstStyle/>
+          <a:p>
+            <a:r>
+              <a:rPr lang="en-GB" sz="1600" dirty="0" smtClean="0">
+                <a:solidFill>
+                  <a:schemeClr val="bg1"/>
+                </a:solidFill>
+              </a:rPr>
+              <a:t>Here you can see what objects are in your work space (Environment) or view your command history (History)</a:t>
+            </a:r>
+          </a:p>
+        </p:txBody>
+      </p:sp>
+      <p:sp>
+        <p:nvSpPr>
+          <p:cNvPr id="18" name="TextBox 17"/>
+          <p:cNvSpPr txBox="1"/>
+          <p:nvPr/>
+        </p:nvSpPr>
+        <p:spPr>
+          <a:xfrm>
+            <a:off x="7749537" y="3993509"/>
+            <a:ext cx="2902714" cy="369332"/>
+          </a:xfrm>
+          <a:prstGeom prst="rect">
+            <a:avLst/>
+          </a:prstGeom>
+          <a:solidFill>
+            <a:schemeClr val="tx1"/>
+          </a:solidFill>
+          <a:ln>
+            <a:solidFill>
+              <a:schemeClr val="bg1"/>
+            </a:solidFill>
+          </a:ln>
+        </p:spPr>
+        <p:txBody>
+          <a:bodyPr wrap="square" rtlCol="0">
+            <a:spAutoFit/>
+          </a:bodyPr>
+          <a:lstStyle/>
+          <a:p>
+            <a:r>
+              <a:rPr lang="en-GB" dirty="0" smtClean="0">
+                <a:solidFill>
+                  <a:schemeClr val="bg1"/>
+                </a:solidFill>
+              </a:rPr>
+              <a:t>4. Files/Plots/Packages/Help</a:t>
+            </a:r>
+            <a:endParaRPr lang="en-GB" dirty="0">
+              <a:solidFill>
+                <a:schemeClr val="bg1"/>
+              </a:solidFill>
+            </a:endParaRPr>
+          </a:p>
+        </p:txBody>
+      </p:sp>
+      <p:sp>
+        <p:nvSpPr>
+          <p:cNvPr id="19" name="TextBox 18"/>
+          <p:cNvSpPr txBox="1"/>
+          <p:nvPr/>
+        </p:nvSpPr>
+        <p:spPr>
+          <a:xfrm>
+            <a:off x="7488384" y="5069653"/>
+            <a:ext cx="4191841" cy="584775"/>
+          </a:xfrm>
+          <a:prstGeom prst="rect">
+            <a:avLst/>
+          </a:prstGeom>
+          <a:solidFill>
+            <a:schemeClr val="tx1"/>
+          </a:solidFill>
+          <a:ln>
+            <a:solidFill>
+              <a:schemeClr val="bg1"/>
+            </a:solidFill>
+          </a:ln>
+        </p:spPr>
+        <p:txBody>
+          <a:bodyPr wrap="square" rtlCol="0">
+            <a:spAutoFit/>
+          </a:bodyPr>
+          <a:lstStyle/>
+          <a:p>
+            <a:r>
+              <a:rPr lang="en-GB" sz="1600" dirty="0" smtClean="0">
+                <a:solidFill>
+                  <a:schemeClr val="bg1"/>
+                </a:solidFill>
+              </a:rPr>
+              <a:t>Here you can see file directories, view plots, see your packages, and access R Help.</a:t>
+            </a:r>
+          </a:p>
+        </p:txBody>
+      </p:sp>
+      <p:sp>
+        <p:nvSpPr>
+          <p:cNvPr id="20" name="TextBox 19"/>
+          <p:cNvSpPr txBox="1"/>
+          <p:nvPr/>
+        </p:nvSpPr>
+        <p:spPr>
+          <a:xfrm>
+            <a:off x="472301" y="971695"/>
+            <a:ext cx="1244987" cy="369332"/>
+          </a:xfrm>
+          <a:prstGeom prst="rect">
+            <a:avLst/>
+          </a:prstGeom>
+          <a:solidFill>
+            <a:schemeClr val="tx1"/>
+          </a:solidFill>
+          <a:ln>
+            <a:solidFill>
+              <a:schemeClr val="bg1"/>
+            </a:solidFill>
+          </a:ln>
+        </p:spPr>
+        <p:txBody>
+          <a:bodyPr wrap="square" rtlCol="0">
+            <a:spAutoFit/>
+          </a:bodyPr>
+          <a:lstStyle/>
+          <a:p>
+            <a:r>
+              <a:rPr lang="en-GB" dirty="0" smtClean="0">
+                <a:solidFill>
+                  <a:schemeClr val="bg1"/>
+                </a:solidFill>
+              </a:rPr>
+              <a:t>1. Source</a:t>
+            </a:r>
+            <a:endParaRPr lang="en-GB" dirty="0">
+              <a:solidFill>
+                <a:schemeClr val="bg1"/>
+              </a:solidFill>
+            </a:endParaRPr>
           </a:p>
         </p:txBody>
       </p:sp>
     </p:spTree>
     <p:extLst>
       <p:ext uri="{BB962C8B-B14F-4D97-AF65-F5344CB8AC3E}">
-        <p14:creationId xmlns:p14="http://schemas.microsoft.com/office/powerpoint/2010/main" val="4097615796"/>
+        <p14:creationId xmlns:p14="http://schemas.microsoft.com/office/powerpoint/2010/main" val="2811485660"/>
       </p:ext>
     </p:extLst>
   </p:cSld>
@@ -3588,9 +4030,9 @@
           <p:nvPr/>
         </p:nvSpPr>
         <p:spPr>
-          <a:xfrm>
-            <a:off x="3196847" y="2967335"/>
-            <a:ext cx="5798319" cy="923330"/>
+          <a:xfrm rot="19615382">
+            <a:off x="3914091" y="2967335"/>
+            <a:ext cx="4363823" cy="923330"/>
           </a:xfrm>
           <a:prstGeom prst="rect">
             <a:avLst/>
@@ -3605,8 +4047,11 @@
           <a:p>
             <a:pPr algn="ctr"/>
             <a:r>
-              <a:rPr lang="en-GB" sz="5400" dirty="0">
+              <a:rPr lang="en-US" sz="5400" b="0" cap="none" spc="0" dirty="0">
                 <a:ln w="0"/>
+                <a:solidFill>
+                  <a:schemeClr val="tx1"/>
+                </a:solidFill>
                 <a:effectLst>
                   <a:outerShdw blurRad="38100" dist="19050" dir="2700000" algn="tl" rotWithShape="0">
                     <a:schemeClr val="dk1">
@@ -3615,41 +4060,15 @@
                   </a:outerShdw>
                 </a:effectLst>
               </a:rPr>
-              <a:t>W</a:t>
-            </a:r>
-            <a:r>
-              <a:rPr lang="en-US" sz="5400" dirty="0">
-                <a:ln w="0"/>
-                <a:effectLst>
-                  <a:outerShdw blurRad="38100" dist="19050" dir="2700000" algn="tl" rotWithShape="0">
-                    <a:schemeClr val="dk1">
-                      <a:alpha val="40000"/>
-                    </a:schemeClr>
-                  </a:outerShdw>
-                </a:effectLst>
-              </a:rPr>
-              <a:t>here you see data</a:t>
-            </a:r>
-            <a:endParaRPr lang="en-US" sz="5400" b="0" cap="none" spc="0" dirty="0">
-              <a:ln w="0"/>
-              <a:solidFill>
-                <a:schemeClr val="tx1"/>
-              </a:solidFill>
-              <a:effectLst>
-                <a:outerShdw blurRad="38100" dist="19050" dir="2700000" algn="tl" rotWithShape="0">
-                  <a:schemeClr val="dk1">
-                    <a:alpha val="40000"/>
-                  </a:schemeClr>
-                </a:outerShdw>
-              </a:effectLst>
-            </a:endParaRPr>
+              <a:t>Looks like SPSS</a:t>
+            </a:r>
           </a:p>
         </p:txBody>
       </p:sp>
     </p:spTree>
     <p:extLst>
       <p:ext uri="{BB962C8B-B14F-4D97-AF65-F5344CB8AC3E}">
-        <p14:creationId xmlns:p14="http://schemas.microsoft.com/office/powerpoint/2010/main" val="1760100122"/>
+        <p14:creationId xmlns:p14="http://schemas.microsoft.com/office/powerpoint/2010/main" val="4097615796"/>
       </p:ext>
     </p:extLst>
   </p:cSld>
@@ -3681,15 +4100,40 @@
           <p:cNvPr id="2" name="Title 1">
             <a:extLst>
               <a:ext uri="{FF2B5EF4-FFF2-40B4-BE49-F238E27FC236}">
-                <a16:creationId xmlns:a16="http://schemas.microsoft.com/office/drawing/2014/main" id="{3DA0F2D2-703F-46AA-895D-961DC56A3995}"/>
-              </a:ext>
-            </a:extLst>
-          </p:cNvPr>
-          <p:cNvSpPr>
-            <a:spLocks noGrp="1"/>
-          </p:cNvSpPr>
-          <p:nvPr>
-            <p:ph type="title"/>
+                <a16:creationId xmlns:a16="http://schemas.microsoft.com/office/drawing/2014/main" id="{5E8E257C-F6B5-4621-A6BE-6C1EAFE1D99A}"/>
+              </a:ext>
+            </a:extLst>
+          </p:cNvPr>
+          <p:cNvSpPr>
+            <a:spLocks noGrp="1"/>
+          </p:cNvSpPr>
+          <p:nvPr>
+            <p:ph type="ctrTitle"/>
+          </p:nvPr>
+        </p:nvSpPr>
+        <p:spPr/>
+        <p:txBody>
+          <a:bodyPr/>
+          <a:lstStyle/>
+          <a:p>
+            <a:endParaRPr lang="en-US"/>
+          </a:p>
+        </p:txBody>
+      </p:sp>
+      <p:sp>
+        <p:nvSpPr>
+          <p:cNvPr id="3" name="Subtitle 2">
+            <a:extLst>
+              <a:ext uri="{FF2B5EF4-FFF2-40B4-BE49-F238E27FC236}">
+                <a16:creationId xmlns:a16="http://schemas.microsoft.com/office/drawing/2014/main" id="{1E46FFF8-EB1A-4A11-BBFA-E8E0AA9BF4D8}"/>
+              </a:ext>
+            </a:extLst>
+          </p:cNvPr>
+          <p:cNvSpPr>
+            <a:spLocks noGrp="1"/>
+          </p:cNvSpPr>
+          <p:nvPr>
+            <p:ph type="subTitle" idx="1"/>
           </p:nvPr>
         </p:nvSpPr>
         <p:spPr/>
@@ -3703,19 +4147,17 @@
       </p:sp>
       <p:pic>
         <p:nvPicPr>
-          <p:cNvPr id="5" name="Content Placeholder 4" descr="A screenshot of a computer&#10;&#10;Description automatically generated">
-            <a:extLst>
-              <a:ext uri="{FF2B5EF4-FFF2-40B4-BE49-F238E27FC236}">
-                <a16:creationId xmlns:a16="http://schemas.microsoft.com/office/drawing/2014/main" id="{EC2D3675-34C2-42E6-BF21-E921A41B4279}"/>
+          <p:cNvPr id="5" name="Picture 4" descr="A screenshot of a social media post&#10;&#10;Description automatically generated">
+            <a:extLst>
+              <a:ext uri="{FF2B5EF4-FFF2-40B4-BE49-F238E27FC236}">
+                <a16:creationId xmlns:a16="http://schemas.microsoft.com/office/drawing/2014/main" id="{7F72D67B-C4F5-4B9B-B426-80F22EACF116}"/>
               </a:ext>
             </a:extLst>
           </p:cNvPr>
           <p:cNvPicPr>
-            <a:picLocks noGrp="1" noChangeAspect="1"/>
+            <a:picLocks noChangeAspect="1"/>
           </p:cNvPicPr>
-          <p:nvPr>
-            <p:ph idx="1"/>
-          </p:nvPr>
+          <p:nvPr/>
         </p:nvPicPr>
         <p:blipFill>
           <a:blip r:embed="rId2">
@@ -3731,9 +4173,12 @@
         </p:blipFill>
         <p:spPr>
           <a:xfrm>
-            <a:off x="269032" y="1488725"/>
-            <a:ext cx="11798394" cy="2392809"/>
+            <a:off x="0" y="125811"/>
+            <a:ext cx="12192000" cy="6606377"/>
           </a:xfrm>
+          <a:prstGeom prst="rect">
+            <a:avLst/>
+          </a:prstGeom>
         </p:spPr>
       </p:pic>
       <p:sp>
@@ -3741,7 +4186,7 @@
           <p:cNvPr id="6" name="Rectangle 5">
             <a:extLst>
               <a:ext uri="{FF2B5EF4-FFF2-40B4-BE49-F238E27FC236}">
-                <a16:creationId xmlns:a16="http://schemas.microsoft.com/office/drawing/2014/main" id="{100FA44E-20C8-44A9-B515-F1612D99F4FD}"/>
+                <a16:creationId xmlns:a16="http://schemas.microsoft.com/office/drawing/2014/main" id="{A62CB3F5-257C-435F-802D-C27B715586C6}"/>
               </a:ext>
             </a:extLst>
           </p:cNvPr>
@@ -3750,8 +4195,8 @@
         </p:nvSpPr>
         <p:spPr>
           <a:xfrm>
-            <a:off x="1934428" y="2887436"/>
-            <a:ext cx="7879273" cy="923330"/>
+            <a:off x="3196847" y="2967335"/>
+            <a:ext cx="5798319" cy="923330"/>
           </a:xfrm>
           <a:prstGeom prst="rect">
             <a:avLst/>
@@ -3789,7 +4234,7 @@
                   </a:outerShdw>
                 </a:effectLst>
               </a:rPr>
-              <a:t>here you define variables</a:t>
+              <a:t>here you see data</a:t>
             </a:r>
             <a:endParaRPr lang="en-US" sz="5400" b="0" cap="none" spc="0" dirty="0">
               <a:ln w="0"/>
@@ -3810,6 +4255,167 @@
     </p:spTree>
     <p:extLst>
       <p:ext uri="{BB962C8B-B14F-4D97-AF65-F5344CB8AC3E}">
+        <p14:creationId xmlns:p14="http://schemas.microsoft.com/office/powerpoint/2010/main" val="1760100122"/>
+      </p:ext>
+    </p:extLst>
+  </p:cSld>
+  <p:clrMapOvr>
+    <a:masterClrMapping/>
+  </p:clrMapOvr>
+</p:sld>
+</file>
+
+<file path=ppt/slides/slide4.xml><?xml version="1.0" encoding="utf-8"?>
+<p:sld xmlns:a="http://schemas.openxmlformats.org/drawingml/2006/main" xmlns:r="http://schemas.openxmlformats.org/officeDocument/2006/relationships" xmlns:p="http://schemas.openxmlformats.org/presentationml/2006/main">
+  <p:cSld>
+    <p:spTree>
+      <p:nvGrpSpPr>
+        <p:cNvPr id="1" name=""/>
+        <p:cNvGrpSpPr/>
+        <p:nvPr/>
+      </p:nvGrpSpPr>
+      <p:grpSpPr>
+        <a:xfrm>
+          <a:off x="0" y="0"/>
+          <a:ext cx="0" cy="0"/>
+          <a:chOff x="0" y="0"/>
+          <a:chExt cx="0" cy="0"/>
+        </a:xfrm>
+      </p:grpSpPr>
+      <p:sp>
+        <p:nvSpPr>
+          <p:cNvPr id="2" name="Title 1">
+            <a:extLst>
+              <a:ext uri="{FF2B5EF4-FFF2-40B4-BE49-F238E27FC236}">
+                <a16:creationId xmlns:a16="http://schemas.microsoft.com/office/drawing/2014/main" id="{3DA0F2D2-703F-46AA-895D-961DC56A3995}"/>
+              </a:ext>
+            </a:extLst>
+          </p:cNvPr>
+          <p:cNvSpPr>
+            <a:spLocks noGrp="1"/>
+          </p:cNvSpPr>
+          <p:nvPr>
+            <p:ph type="title"/>
+          </p:nvPr>
+        </p:nvSpPr>
+        <p:spPr/>
+        <p:txBody>
+          <a:bodyPr/>
+          <a:lstStyle/>
+          <a:p>
+            <a:endParaRPr lang="en-US"/>
+          </a:p>
+        </p:txBody>
+      </p:sp>
+      <p:pic>
+        <p:nvPicPr>
+          <p:cNvPr id="5" name="Content Placeholder 4" descr="A screenshot of a computer&#10;&#10;Description automatically generated">
+            <a:extLst>
+              <a:ext uri="{FF2B5EF4-FFF2-40B4-BE49-F238E27FC236}">
+                <a16:creationId xmlns:a16="http://schemas.microsoft.com/office/drawing/2014/main" id="{EC2D3675-34C2-42E6-BF21-E921A41B4279}"/>
+              </a:ext>
+            </a:extLst>
+          </p:cNvPr>
+          <p:cNvPicPr>
+            <a:picLocks noGrp="1" noChangeAspect="1"/>
+          </p:cNvPicPr>
+          <p:nvPr>
+            <p:ph idx="1"/>
+          </p:nvPr>
+        </p:nvPicPr>
+        <p:blipFill>
+          <a:blip r:embed="rId2">
+            <a:extLst>
+              <a:ext uri="{28A0092B-C50C-407E-A947-70E740481C1C}">
+                <a14:useLocalDpi xmlns:a14="http://schemas.microsoft.com/office/drawing/2010/main" val="0"/>
+              </a:ext>
+            </a:extLst>
+          </a:blip>
+          <a:stretch>
+            <a:fillRect/>
+          </a:stretch>
+        </p:blipFill>
+        <p:spPr>
+          <a:xfrm>
+            <a:off x="269032" y="1488725"/>
+            <a:ext cx="11798394" cy="2392809"/>
+          </a:xfrm>
+        </p:spPr>
+      </p:pic>
+      <p:sp>
+        <p:nvSpPr>
+          <p:cNvPr id="6" name="Rectangle 5">
+            <a:extLst>
+              <a:ext uri="{FF2B5EF4-FFF2-40B4-BE49-F238E27FC236}">
+                <a16:creationId xmlns:a16="http://schemas.microsoft.com/office/drawing/2014/main" id="{100FA44E-20C8-44A9-B515-F1612D99F4FD}"/>
+              </a:ext>
+            </a:extLst>
+          </p:cNvPr>
+          <p:cNvSpPr/>
+          <p:nvPr/>
+        </p:nvSpPr>
+        <p:spPr>
+          <a:xfrm>
+            <a:off x="1934428" y="2887436"/>
+            <a:ext cx="7879273" cy="923330"/>
+          </a:xfrm>
+          <a:prstGeom prst="rect">
+            <a:avLst/>
+          </a:prstGeom>
+          <a:noFill/>
+        </p:spPr>
+        <p:txBody>
+          <a:bodyPr wrap="none" lIns="91440" tIns="45720" rIns="91440" bIns="45720">
+            <a:spAutoFit/>
+          </a:bodyPr>
+          <a:lstStyle/>
+          <a:p>
+            <a:pPr algn="ctr"/>
+            <a:r>
+              <a:rPr lang="en-GB" sz="5400" dirty="0">
+                <a:ln w="0"/>
+                <a:effectLst>
+                  <a:outerShdw blurRad="38100" dist="19050" dir="2700000" algn="tl" rotWithShape="0">
+                    <a:schemeClr val="dk1">
+                      <a:alpha val="40000"/>
+                    </a:schemeClr>
+                  </a:outerShdw>
+                </a:effectLst>
+              </a:rPr>
+              <a:t>W</a:t>
+            </a:r>
+            <a:r>
+              <a:rPr lang="en-US" sz="5400" dirty="0">
+                <a:ln w="0"/>
+                <a:effectLst>
+                  <a:outerShdw blurRad="38100" dist="19050" dir="2700000" algn="tl" rotWithShape="0">
+                    <a:schemeClr val="dk1">
+                      <a:alpha val="40000"/>
+                    </a:schemeClr>
+                  </a:outerShdw>
+                </a:effectLst>
+              </a:rPr>
+              <a:t>here you define variables</a:t>
+            </a:r>
+            <a:endParaRPr lang="en-US" sz="5400" b="0" cap="none" spc="0" dirty="0">
+              <a:ln w="0"/>
+              <a:solidFill>
+                <a:schemeClr val="tx1"/>
+              </a:solidFill>
+              <a:effectLst>
+                <a:outerShdw blurRad="38100" dist="19050" dir="2700000" algn="tl" rotWithShape="0">
+                  <a:schemeClr val="dk1">
+                    <a:alpha val="40000"/>
+                  </a:schemeClr>
+                </a:outerShdw>
+              </a:effectLst>
+            </a:endParaRPr>
+          </a:p>
+        </p:txBody>
+      </p:sp>
+    </p:spTree>
+    <p:extLst>
+      <p:ext uri="{BB962C8B-B14F-4D97-AF65-F5344CB8AC3E}">
         <p14:creationId xmlns:p14="http://schemas.microsoft.com/office/powerpoint/2010/main" val="2120376068"/>
       </p:ext>
     </p:extLst>
@@ -3820,7 +4426,7 @@
 </p:sld>
 </file>
 
-<file path=ppt/slides/slide4.xml><?xml version="1.0" encoding="utf-8"?>
+<file path=ppt/slides/slide5.xml><?xml version="1.0" encoding="utf-8"?>
 <p:sld xmlns:a="http://schemas.openxmlformats.org/drawingml/2006/main" xmlns:r="http://schemas.openxmlformats.org/officeDocument/2006/relationships" xmlns:p="http://schemas.openxmlformats.org/presentationml/2006/main">
   <p:cSld>
     <p:spTree>
@@ -4010,7 +4616,7 @@
 </p:sld>
 </file>
 
-<file path=ppt/slides/slide5.xml><?xml version="1.0" encoding="utf-8"?>
+<file path=ppt/slides/slide6.xml><?xml version="1.0" encoding="utf-8"?>
 <p:sld xmlns:a="http://schemas.openxmlformats.org/drawingml/2006/main" xmlns:r="http://schemas.openxmlformats.org/officeDocument/2006/relationships" xmlns:p="http://schemas.openxmlformats.org/presentationml/2006/main">
   <p:cSld>
     <p:spTree>

</xml_diff>